<commit_message>
fixed some slides, added slide numbers
</commit_message>
<xml_diff>
--- a/Snakemake-introduction.pptx
+++ b/Snakemake-introduction.pptx
@@ -7,6 +7,9 @@
   <p:notesMasterIdLst>
     <p:notesMasterId r:id="rId47"/>
   </p:notesMasterIdLst>
+  <p:handoutMasterIdLst>
+    <p:handoutMasterId r:id="rId48"/>
+  </p:handoutMasterIdLst>
   <p:sldIdLst>
     <p:sldId id="256" r:id="rId2"/>
     <p:sldId id="257" r:id="rId3"/>
@@ -152,6 +155,171 @@
     </a:lvl9pPr>
   </p:defaultTextStyle>
 </p:presentation>
+</file>
+
+<file path=ppt/handoutMasters/handoutMaster1.xml><?xml version="1.0" encoding="utf-8"?>
+<p:handoutMaster xmlns:a="http://schemas.openxmlformats.org/drawingml/2006/main" xmlns:r="http://schemas.openxmlformats.org/officeDocument/2006/relationships" xmlns:p="http://schemas.openxmlformats.org/presentationml/2006/main">
+  <p:cSld>
+    <p:bg>
+      <p:bgRef idx="1001">
+        <a:schemeClr val="bg1"/>
+      </p:bgRef>
+    </p:bg>
+    <p:spTree>
+      <p:nvGrpSpPr>
+        <p:cNvPr id="1" name=""/>
+        <p:cNvGrpSpPr/>
+        <p:nvPr/>
+      </p:nvGrpSpPr>
+      <p:grpSpPr>
+        <a:xfrm>
+          <a:off x="0" y="0"/>
+          <a:ext cx="0" cy="0"/>
+          <a:chOff x="0" y="0"/>
+          <a:chExt cx="0" cy="0"/>
+        </a:xfrm>
+      </p:grpSpPr>
+      <p:sp>
+        <p:nvSpPr>
+          <p:cNvPr id="2" name="Header Placeholder 1"/>
+          <p:cNvSpPr>
+            <a:spLocks noGrp="1"/>
+          </p:cNvSpPr>
+          <p:nvPr>
+            <p:ph type="hdr" sz="quarter"/>
+          </p:nvPr>
+        </p:nvSpPr>
+        <p:spPr>
+          <a:xfrm>
+            <a:off x="0" y="0"/>
+            <a:ext cx="2971800" cy="457200"/>
+          </a:xfrm>
+          <a:prstGeom prst="rect">
+            <a:avLst/>
+          </a:prstGeom>
+        </p:spPr>
+        <p:txBody>
+          <a:bodyPr vert="horz" lIns="91440" tIns="45720" rIns="91440" bIns="45720" rtlCol="0"/>
+          <a:lstStyle>
+            <a:lvl1pPr algn="l">
+              <a:defRPr sz="1200"/>
+            </a:lvl1pPr>
+          </a:lstStyle>
+          <a:p>
+            <a:endParaRPr lang="en-US"/>
+          </a:p>
+        </p:txBody>
+      </p:sp>
+      <p:sp>
+        <p:nvSpPr>
+          <p:cNvPr id="3" name="Date Placeholder 2"/>
+          <p:cNvSpPr>
+            <a:spLocks noGrp="1"/>
+          </p:cNvSpPr>
+          <p:nvPr>
+            <p:ph type="dt" sz="quarter" idx="1"/>
+          </p:nvPr>
+        </p:nvSpPr>
+        <p:spPr>
+          <a:xfrm>
+            <a:off x="3884613" y="0"/>
+            <a:ext cx="2971800" cy="457200"/>
+          </a:xfrm>
+          <a:prstGeom prst="rect">
+            <a:avLst/>
+          </a:prstGeom>
+        </p:spPr>
+        <p:txBody>
+          <a:bodyPr vert="horz" lIns="91440" tIns="45720" rIns="91440" bIns="45720" rtlCol="0"/>
+          <a:lstStyle>
+            <a:lvl1pPr algn="r">
+              <a:defRPr sz="1200"/>
+            </a:lvl1pPr>
+          </a:lstStyle>
+          <a:p>
+            <a:fld id="{4891E098-7F76-E040-9498-94D26AD9F8BA}" type="datetimeFigureOut">
+              <a:rPr lang="en-US" smtClean="0"/>
+              <a:t>03/02/16</a:t>
+            </a:fld>
+            <a:endParaRPr lang="en-US"/>
+          </a:p>
+        </p:txBody>
+      </p:sp>
+      <p:sp>
+        <p:nvSpPr>
+          <p:cNvPr id="4" name="Footer Placeholder 3"/>
+          <p:cNvSpPr>
+            <a:spLocks noGrp="1"/>
+          </p:cNvSpPr>
+          <p:nvPr>
+            <p:ph type="ftr" sz="quarter" idx="2"/>
+          </p:nvPr>
+        </p:nvSpPr>
+        <p:spPr>
+          <a:xfrm>
+            <a:off x="0" y="8685213"/>
+            <a:ext cx="2971800" cy="457200"/>
+          </a:xfrm>
+          <a:prstGeom prst="rect">
+            <a:avLst/>
+          </a:prstGeom>
+        </p:spPr>
+        <p:txBody>
+          <a:bodyPr vert="horz" lIns="91440" tIns="45720" rIns="91440" bIns="45720" rtlCol="0" anchor="b"/>
+          <a:lstStyle>
+            <a:lvl1pPr algn="l">
+              <a:defRPr sz="1200"/>
+            </a:lvl1pPr>
+          </a:lstStyle>
+          <a:p>
+            <a:endParaRPr lang="en-US"/>
+          </a:p>
+        </p:txBody>
+      </p:sp>
+      <p:sp>
+        <p:nvSpPr>
+          <p:cNvPr id="5" name="Slide Number Placeholder 4"/>
+          <p:cNvSpPr>
+            <a:spLocks noGrp="1"/>
+          </p:cNvSpPr>
+          <p:nvPr>
+            <p:ph type="sldNum" sz="quarter" idx="3"/>
+          </p:nvPr>
+        </p:nvSpPr>
+        <p:spPr>
+          <a:xfrm>
+            <a:off x="3884613" y="8685213"/>
+            <a:ext cx="2971800" cy="457200"/>
+          </a:xfrm>
+          <a:prstGeom prst="rect">
+            <a:avLst/>
+          </a:prstGeom>
+        </p:spPr>
+        <p:txBody>
+          <a:bodyPr vert="horz" lIns="91440" tIns="45720" rIns="91440" bIns="45720" rtlCol="0" anchor="b"/>
+          <a:lstStyle>
+            <a:lvl1pPr algn="r">
+              <a:defRPr sz="1200"/>
+            </a:lvl1pPr>
+          </a:lstStyle>
+          <a:p>
+            <a:fld id="{7190C2CF-EB88-494E-8427-B567BCF78CE0}" type="slidenum">
+              <a:rPr lang="en-US" smtClean="0"/>
+              <a:t>‹#›</a:t>
+            </a:fld>
+            <a:endParaRPr lang="en-US"/>
+          </a:p>
+        </p:txBody>
+      </p:sp>
+    </p:spTree>
+    <p:extLst>
+      <p:ext uri="{BB962C8B-B14F-4D97-AF65-F5344CB8AC3E}">
+        <p14:creationId xmlns:p14="http://schemas.microsoft.com/office/powerpoint/2010/main" val="2117395108"/>
+      </p:ext>
+    </p:extLst>
+  </p:cSld>
+  <p:clrMap bg1="lt1" tx1="dk1" bg2="lt2" tx2="dk2" accent1="accent1" accent2="accent2" accent3="accent3" accent4="accent4" accent5="accent5" accent6="accent6" hlink="hlink" folHlink="folHlink"/>
+</p:handoutMaster>
 </file>
 
 <file path=ppt/notesMasters/notesMaster1.xml><?xml version="1.0" encoding="utf-8"?>
@@ -3449,6 +3617,47 @@
           </a:prstGeom>
         </p:spPr>
       </p:pic>
+      <p:sp>
+        <p:nvSpPr>
+          <p:cNvPr id="4" name="Slide Number Placeholder 3"/>
+          <p:cNvSpPr>
+            <a:spLocks noGrp="1"/>
+          </p:cNvSpPr>
+          <p:nvPr>
+            <p:ph type="sldNum" sz="quarter" idx="4"/>
+          </p:nvPr>
+        </p:nvSpPr>
+        <p:spPr>
+          <a:xfrm>
+            <a:off x="6424925" y="6316329"/>
+            <a:ext cx="884050" cy="365125"/>
+          </a:xfrm>
+          <a:prstGeom prst="rect">
+            <a:avLst/>
+          </a:prstGeom>
+        </p:spPr>
+        <p:txBody>
+          <a:bodyPr vert="horz" lIns="91440" tIns="45720" rIns="91440" bIns="45720" rtlCol="0" anchor="ctr"/>
+          <a:lstStyle>
+            <a:lvl1pPr algn="r">
+              <a:defRPr sz="1200">
+                <a:solidFill>
+                  <a:schemeClr val="tx1">
+                    <a:tint val="75000"/>
+                  </a:schemeClr>
+                </a:solidFill>
+              </a:defRPr>
+            </a:lvl1pPr>
+          </a:lstStyle>
+          <a:p>
+            <a:fld id="{636E208C-973C-9147-A115-852F67BBE3DA}" type="slidenum">
+              <a:rPr lang="en-US" smtClean="0"/>
+              <a:t>‹#›</a:t>
+            </a:fld>
+            <a:endParaRPr lang="en-US"/>
+          </a:p>
+        </p:txBody>
+      </p:sp>
     </p:spTree>
     <p:extLst>
       <p:ext uri="{BB962C8B-B14F-4D97-AF65-F5344CB8AC3E}">
@@ -3790,15 +3999,7 @@
           <a:p>
             <a:r>
               <a:rPr lang="en-US" dirty="0" smtClean="0"/>
-              <a:t>EMBL </a:t>
-            </a:r>
-            <a:r>
-              <a:rPr lang="en-US" dirty="0" smtClean="0"/>
-              <a:t>02/</a:t>
-            </a:r>
-            <a:r>
-              <a:rPr lang="en-US" dirty="0" smtClean="0"/>
-              <a:t>2016</a:t>
+              <a:t>EMBL 02/2016</a:t>
             </a:r>
             <a:endParaRPr lang="en-US" dirty="0"/>
           </a:p>
@@ -7092,7 +7293,7 @@
         </p:spPr>
         <p:txBody>
           <a:bodyPr>
-            <a:normAutofit lnSpcReduction="10000"/>
+            <a:normAutofit fontScale="92500" lnSpcReduction="10000"/>
           </a:bodyPr>
           <a:lstStyle/>
           <a:p>
@@ -7159,7 +7360,11 @@
             </a:r>
             <a:r>
               <a:rPr lang="en-US" b="1" dirty="0" smtClean="0"/>
-              <a:t> /g/</a:t>
+              <a:t> </a:t>
+            </a:r>
+            <a:r>
+              <a:rPr lang="en-US" b="1" dirty="0" smtClean="0"/>
+              <a:t>/g/</a:t>
             </a:r>
             <a:r>
               <a:rPr lang="en-US" b="1" dirty="0" err="1" smtClean="0"/>
@@ -7174,6 +7379,64 @@
               <a:t>snakemake.sh</a:t>
             </a:r>
             <a:endParaRPr lang="en-US" b="1" dirty="0" smtClean="0"/>
+          </a:p>
+          <a:p>
+            <a:pPr marL="0" indent="0">
+              <a:buNone/>
+            </a:pPr>
+            <a:r>
+              <a:rPr lang="en-US" sz="2400" b="1" dirty="0" smtClean="0"/>
+              <a:t>(or </a:t>
+            </a:r>
+            <a:r>
+              <a:rPr lang="en-US" sz="2400" b="1" dirty="0">
+                <a:solidFill>
+                  <a:srgbClr val="7F7F7F"/>
+                </a:solidFill>
+              </a:rPr>
+              <a:t>&gt;</a:t>
+            </a:r>
+            <a:r>
+              <a:rPr lang="en-US" sz="2400" b="1" dirty="0" smtClean="0"/>
+              <a:t> </a:t>
+            </a:r>
+            <a:r>
+              <a:rPr lang="en-US" sz="2400" b="1" dirty="0" err="1" smtClean="0"/>
+              <a:t>git</a:t>
+            </a:r>
+            <a:r>
+              <a:rPr lang="en-US" sz="2400" b="1" dirty="0"/>
+              <a:t> clone https://</a:t>
+            </a:r>
+            <a:r>
+              <a:rPr lang="en-US" sz="2400" b="1" dirty="0" err="1"/>
+              <a:t>git.embl.de</a:t>
+            </a:r>
+            <a:r>
+              <a:rPr lang="en-US" sz="2400" b="1" dirty="0"/>
+              <a:t>/</a:t>
+            </a:r>
+            <a:r>
+              <a:rPr lang="en-US" sz="2400" b="1" dirty="0" err="1"/>
+              <a:t>schwarzl</a:t>
+            </a:r>
+            <a:r>
+              <a:rPr lang="en-US" sz="2400" b="1" dirty="0"/>
+              <a:t>/</a:t>
+            </a:r>
+            <a:r>
+              <a:rPr lang="en-US" sz="2400" b="1" dirty="0" err="1"/>
+              <a:t>snakemake-</a:t>
+            </a:r>
+            <a:r>
+              <a:rPr lang="en-US" sz="2400" b="1" dirty="0" err="1" smtClean="0"/>
+              <a:t>tutorial.git</a:t>
+            </a:r>
+            <a:r>
+              <a:rPr lang="en-US" sz="2400" b="1" dirty="0" smtClean="0"/>
+              <a:t>)</a:t>
+            </a:r>
+            <a:endParaRPr lang="en-US" sz="2400" b="1" dirty="0" smtClean="0"/>
           </a:p>
           <a:p>
             <a:pPr marL="0" indent="0">
@@ -7226,6 +7489,34 @@
               <a:buNone/>
             </a:pPr>
             <a:endParaRPr lang="en-US" b="1" dirty="0" smtClean="0"/>
+          </a:p>
+        </p:txBody>
+      </p:sp>
+      <p:sp>
+        <p:nvSpPr>
+          <p:cNvPr id="4" name="Slide Number Placeholder 3"/>
+          <p:cNvSpPr>
+            <a:spLocks noGrp="1"/>
+          </p:cNvSpPr>
+          <p:nvPr>
+            <p:ph type="sldNum" sz="quarter" idx="12"/>
+          </p:nvPr>
+        </p:nvSpPr>
+        <p:spPr>
+          <a:xfrm>
+            <a:off x="7573895" y="6476235"/>
+            <a:ext cx="505250" cy="498018"/>
+          </a:xfrm>
+        </p:spPr>
+        <p:txBody>
+          <a:bodyPr/>
+          <a:lstStyle/>
+          <a:p>
+            <a:fld id="{D09DAC92-C97B-934B-A404-3E3077E3B66F}" type="slidenum">
+              <a:rPr lang="en-US" sz="2000" smtClean="0"/>
+              <a:t>16</a:t>
+            </a:fld>
+            <a:endParaRPr lang="en-US" sz="2000"/>
           </a:p>
         </p:txBody>
       </p:sp>
@@ -7239,6 +7530,13 @@
   <p:clrMapOvr>
     <a:masterClrMapping/>
   </p:clrMapOvr>
+  <p:timing>
+    <p:tnLst>
+      <p:par>
+        <p:cTn xmlns:p14="http://schemas.microsoft.com/office/powerpoint/2010/main" id="1" dur="indefinite" restart="never" nodeType="tmRoot"/>
+      </p:par>
+    </p:tnLst>
+  </p:timing>
 </p:sld>
 </file>
 
@@ -7313,10 +7611,6 @@
               <a:rPr lang="en-US" dirty="0" smtClean="0"/>
               <a:t>Input files</a:t>
             </a:r>
-            <a:r>
-              <a:rPr lang="en-US" dirty="0" smtClean="0"/>
-              <a:t/>
-            </a:r>
             <a:br>
               <a:rPr lang="en-US" dirty="0" smtClean="0"/>
             </a:br>
@@ -7387,7 +7681,6 @@
               <a:rPr lang="en-US" dirty="0" smtClean="0"/>
               <a:t> file</a:t>
             </a:r>
-            <a:endParaRPr lang="en-US" dirty="0" smtClean="0"/>
           </a:p>
           <a:p>
             <a:pPr marL="0" indent="0">
@@ -8046,6 +8339,34 @@
           </p:txBody>
         </p:sp>
       </p:grpSp>
+      <p:sp>
+        <p:nvSpPr>
+          <p:cNvPr id="26" name="Slide Number Placeholder 3"/>
+          <p:cNvSpPr>
+            <a:spLocks noGrp="1"/>
+          </p:cNvSpPr>
+          <p:nvPr>
+            <p:ph type="sldNum" sz="quarter" idx="12"/>
+          </p:nvPr>
+        </p:nvSpPr>
+        <p:spPr>
+          <a:xfrm>
+            <a:off x="7573895" y="6476235"/>
+            <a:ext cx="505250" cy="498018"/>
+          </a:xfrm>
+        </p:spPr>
+        <p:txBody>
+          <a:bodyPr/>
+          <a:lstStyle/>
+          <a:p>
+            <a:fld id="{D09DAC92-C97B-934B-A404-3E3077E3B66F}" type="slidenum">
+              <a:rPr lang="en-US" sz="2000" smtClean="0"/>
+              <a:t>17</a:t>
+            </a:fld>
+            <a:endParaRPr lang="en-US" sz="2000"/>
+          </a:p>
+        </p:txBody>
+      </p:sp>
     </p:spTree>
     <p:extLst>
       <p:ext uri="{BB962C8B-B14F-4D97-AF65-F5344CB8AC3E}">
@@ -9221,7 +9542,6 @@
               <a:rPr lang="en-US" b="1" dirty="0" smtClean="0"/>
               <a:t>”</a:t>
             </a:r>
-            <a:endParaRPr lang="en-US" b="1" dirty="0" smtClean="0"/>
           </a:p>
         </p:txBody>
       </p:sp>
@@ -9314,7 +9634,15 @@
             </a:r>
             <a:r>
               <a:rPr lang="nl-NL" b="1" dirty="0" smtClean="0"/>
-              <a:t>cut -f7 –d ‘ ‘  </a:t>
+              <a:t>cut </a:t>
+            </a:r>
+            <a:r>
+              <a:rPr lang="nl-NL" b="1" dirty="0" smtClean="0"/>
+              <a:t>-f1 </a:t>
+            </a:r>
+            <a:r>
+              <a:rPr lang="nl-NL" b="1" dirty="0" smtClean="0"/>
+              <a:t>–d ‘ ‘  </a:t>
             </a:r>
             <a:r>
               <a:rPr lang="en-US" b="1" dirty="0" smtClean="0"/>
@@ -9448,7 +9776,6 @@
               <a:rPr lang="en-US" b="1" dirty="0" smtClean="0"/>
               <a:t>”</a:t>
             </a:r>
-            <a:endParaRPr lang="en-US" b="1" dirty="0" smtClean="0"/>
           </a:p>
         </p:txBody>
       </p:sp>
@@ -9496,6 +9823,34 @@
               <a:rPr lang="en-US" b="1" dirty="0" smtClean="0"/>
               <a:t> –c {input} &gt; {output}” </a:t>
             </a:r>
+          </a:p>
+        </p:txBody>
+      </p:sp>
+      <p:sp>
+        <p:nvSpPr>
+          <p:cNvPr id="42" name="Slide Number Placeholder 3"/>
+          <p:cNvSpPr>
+            <a:spLocks noGrp="1"/>
+          </p:cNvSpPr>
+          <p:nvPr>
+            <p:ph type="sldNum" sz="quarter" idx="12"/>
+          </p:nvPr>
+        </p:nvSpPr>
+        <p:spPr>
+          <a:xfrm>
+            <a:off x="7573895" y="6476235"/>
+            <a:ext cx="505250" cy="498018"/>
+          </a:xfrm>
+        </p:spPr>
+        <p:txBody>
+          <a:bodyPr/>
+          <a:lstStyle/>
+          <a:p>
+            <a:fld id="{D09DAC92-C97B-934B-A404-3E3077E3B66F}" type="slidenum">
+              <a:rPr lang="en-US" sz="2000" smtClean="0"/>
+              <a:t>18</a:t>
+            </a:fld>
+            <a:endParaRPr lang="en-US" sz="2000"/>
           </a:p>
         </p:txBody>
       </p:sp>
@@ -10717,6 +11072,34 @@
               <a:t>extract.txt</a:t>
             </a:r>
             <a:endParaRPr lang="en-US" sz="2800" b="1" dirty="0"/>
+          </a:p>
+        </p:txBody>
+      </p:sp>
+      <p:sp>
+        <p:nvSpPr>
+          <p:cNvPr id="30" name="Slide Number Placeholder 3"/>
+          <p:cNvSpPr>
+            <a:spLocks noGrp="1"/>
+          </p:cNvSpPr>
+          <p:nvPr>
+            <p:ph type="sldNum" sz="quarter" idx="12"/>
+          </p:nvPr>
+        </p:nvSpPr>
+        <p:spPr>
+          <a:xfrm>
+            <a:off x="7573895" y="6476235"/>
+            <a:ext cx="505250" cy="498018"/>
+          </a:xfrm>
+        </p:spPr>
+        <p:txBody>
+          <a:bodyPr/>
+          <a:lstStyle/>
+          <a:p>
+            <a:fld id="{D09DAC92-C97B-934B-A404-3E3077E3B66F}" type="slidenum">
+              <a:rPr lang="en-US" sz="2000" smtClean="0"/>
+              <a:t>19</a:t>
+            </a:fld>
+            <a:endParaRPr lang="en-US" sz="2000"/>
           </a:p>
         </p:txBody>
       </p:sp>
@@ -13804,7 +14187,7 @@
         </p:nvSpPr>
         <p:spPr>
           <a:xfrm>
-            <a:off x="5266464" y="1363860"/>
+            <a:off x="5293774" y="1363860"/>
             <a:ext cx="3136408" cy="307777"/>
           </a:xfrm>
           <a:prstGeom prst="rect">
@@ -13884,6 +14267,34 @@
           <a:p>
             <a:pPr algn="ctr"/>
             <a:endParaRPr lang="en-US"/>
+          </a:p>
+        </p:txBody>
+      </p:sp>
+      <p:sp>
+        <p:nvSpPr>
+          <p:cNvPr id="36" name="Slide Number Placeholder 3"/>
+          <p:cNvSpPr>
+            <a:spLocks noGrp="1"/>
+          </p:cNvSpPr>
+          <p:nvPr>
+            <p:ph type="sldNum" sz="quarter" idx="12"/>
+          </p:nvPr>
+        </p:nvSpPr>
+        <p:spPr>
+          <a:xfrm>
+            <a:off x="7573895" y="6476235"/>
+            <a:ext cx="505250" cy="498018"/>
+          </a:xfrm>
+        </p:spPr>
+        <p:txBody>
+          <a:bodyPr/>
+          <a:lstStyle/>
+          <a:p>
+            <a:fld id="{D09DAC92-C97B-934B-A404-3E3077E3B66F}" type="slidenum">
+              <a:rPr lang="en-US" sz="2000" smtClean="0"/>
+              <a:t>20</a:t>
+            </a:fld>
+            <a:endParaRPr lang="en-US" sz="2000"/>
           </a:p>
         </p:txBody>
       </p:sp>
@@ -14882,11 +15293,7 @@
             </a:r>
             <a:r>
               <a:rPr lang="en-US" b="1" dirty="0" smtClean="0"/>
-              <a:t> </a:t>
-            </a:r>
-            <a:r>
-              <a:rPr lang="en-US" b="1" dirty="0" smtClean="0"/>
-              <a:t>–f </a:t>
+              <a:t> –f </a:t>
             </a:r>
             <a:r>
               <a:rPr lang="en-US" b="1" dirty="0" err="1" smtClean="0"/>
@@ -15083,6 +15490,34 @@
                 <a:srgbClr val="E61216"/>
               </a:solidFill>
             </a:endParaRPr>
+          </a:p>
+        </p:txBody>
+      </p:sp>
+      <p:sp>
+        <p:nvSpPr>
+          <p:cNvPr id="31" name="Slide Number Placeholder 3"/>
+          <p:cNvSpPr>
+            <a:spLocks noGrp="1"/>
+          </p:cNvSpPr>
+          <p:nvPr>
+            <p:ph type="sldNum" sz="quarter" idx="12"/>
+          </p:nvPr>
+        </p:nvSpPr>
+        <p:spPr>
+          <a:xfrm>
+            <a:off x="7573895" y="6476235"/>
+            <a:ext cx="505250" cy="498018"/>
+          </a:xfrm>
+        </p:spPr>
+        <p:txBody>
+          <a:bodyPr/>
+          <a:lstStyle/>
+          <a:p>
+            <a:fld id="{D09DAC92-C97B-934B-A404-3E3077E3B66F}" type="slidenum">
+              <a:rPr lang="en-US" sz="2000" smtClean="0"/>
+              <a:t>21</a:t>
+            </a:fld>
+            <a:endParaRPr lang="en-US" sz="2000"/>
           </a:p>
         </p:txBody>
       </p:sp>
@@ -15303,6 +15738,34 @@
           </a:p>
         </p:txBody>
       </p:sp>
+      <p:sp>
+        <p:nvSpPr>
+          <p:cNvPr id="4" name="Slide Number Placeholder 3"/>
+          <p:cNvSpPr>
+            <a:spLocks noGrp="1"/>
+          </p:cNvSpPr>
+          <p:nvPr>
+            <p:ph type="sldNum" sz="quarter" idx="12"/>
+          </p:nvPr>
+        </p:nvSpPr>
+        <p:spPr>
+          <a:xfrm>
+            <a:off x="7573895" y="6476235"/>
+            <a:ext cx="505250" cy="498018"/>
+          </a:xfrm>
+        </p:spPr>
+        <p:txBody>
+          <a:bodyPr/>
+          <a:lstStyle/>
+          <a:p>
+            <a:fld id="{D09DAC92-C97B-934B-A404-3E3077E3B66F}" type="slidenum">
+              <a:rPr lang="en-US" sz="2000" smtClean="0"/>
+              <a:t>22</a:t>
+            </a:fld>
+            <a:endParaRPr lang="en-US" sz="2000"/>
+          </a:p>
+        </p:txBody>
+      </p:sp>
     </p:spTree>
     <p:extLst>
       <p:ext uri="{BB962C8B-B14F-4D97-AF65-F5344CB8AC3E}">
@@ -15504,6 +15967,34 @@
               <a:buNone/>
             </a:pPr>
             <a:endParaRPr lang="en-US" dirty="0"/>
+          </a:p>
+        </p:txBody>
+      </p:sp>
+      <p:sp>
+        <p:nvSpPr>
+          <p:cNvPr id="4" name="Slide Number Placeholder 3"/>
+          <p:cNvSpPr>
+            <a:spLocks noGrp="1"/>
+          </p:cNvSpPr>
+          <p:nvPr>
+            <p:ph type="sldNum" sz="quarter" idx="12"/>
+          </p:nvPr>
+        </p:nvSpPr>
+        <p:spPr>
+          <a:xfrm>
+            <a:off x="7573895" y="6476235"/>
+            <a:ext cx="505250" cy="498018"/>
+          </a:xfrm>
+        </p:spPr>
+        <p:txBody>
+          <a:bodyPr/>
+          <a:lstStyle/>
+          <a:p>
+            <a:fld id="{D09DAC92-C97B-934B-A404-3E3077E3B66F}" type="slidenum">
+              <a:rPr lang="en-US" sz="2000" smtClean="0"/>
+              <a:t>23</a:t>
+            </a:fld>
+            <a:endParaRPr lang="en-US" sz="2000"/>
           </a:p>
         </p:txBody>
       </p:sp>
@@ -15682,15 +16173,7 @@
                   <a:schemeClr val="accent5"/>
                 </a:solidFill>
               </a:rPr>
-              <a:t>“summarizing counts </a:t>
-            </a:r>
-            <a:r>
-              <a:rPr lang="en-US" b="1" dirty="0" smtClean="0">
-                <a:solidFill>
-                  <a:schemeClr val="accent5"/>
-                </a:solidFill>
-              </a:rPr>
-              <a:t>from {input} and creating {output}”</a:t>
+              <a:t>“summarizing counts from {input} and creating {output}”</a:t>
             </a:r>
           </a:p>
         </p:txBody>
@@ -15907,6 +16390,34 @@
                 <a:srgbClr val="E61216"/>
               </a:solidFill>
             </a:endParaRPr>
+          </a:p>
+        </p:txBody>
+      </p:sp>
+      <p:sp>
+        <p:nvSpPr>
+          <p:cNvPr id="11" name="Slide Number Placeholder 3"/>
+          <p:cNvSpPr>
+            <a:spLocks noGrp="1"/>
+          </p:cNvSpPr>
+          <p:nvPr>
+            <p:ph type="sldNum" sz="quarter" idx="12"/>
+          </p:nvPr>
+        </p:nvSpPr>
+        <p:spPr>
+          <a:xfrm>
+            <a:off x="7573895" y="6476235"/>
+            <a:ext cx="505250" cy="498018"/>
+          </a:xfrm>
+        </p:spPr>
+        <p:txBody>
+          <a:bodyPr/>
+          <a:lstStyle/>
+          <a:p>
+            <a:fld id="{D09DAC92-C97B-934B-A404-3E3077E3B66F}" type="slidenum">
+              <a:rPr lang="en-US" sz="2000" smtClean="0"/>
+              <a:t>24</a:t>
+            </a:fld>
+            <a:endParaRPr lang="en-US" sz="2000"/>
           </a:p>
         </p:txBody>
       </p:sp>
@@ -16067,7 +16578,6 @@
               <a:rPr lang="en-US" b="1" dirty="0" smtClean="0"/>
               <a:t>	“summarizing counts from {input} and creating {output}”</a:t>
             </a:r>
-            <a:endParaRPr lang="en-US" b="1" dirty="0" smtClean="0"/>
           </a:p>
         </p:txBody>
       </p:sp>
@@ -16315,15 +16825,7 @@
                   <a:srgbClr val="E61216"/>
                 </a:solidFill>
               </a:rPr>
-              <a:t>SAMPLES = “</a:t>
-            </a:r>
-            <a:r>
-              <a:rPr lang="en-US" b="1" dirty="0" smtClean="0">
-                <a:solidFill>
-                  <a:srgbClr val="E61216"/>
-                </a:solidFill>
-              </a:rPr>
-              <a:t>A </a:t>
+              <a:t>SAMPLES = “A </a:t>
             </a:r>
             <a:r>
               <a:rPr lang="en-US" b="1" dirty="0" err="1" smtClean="0">
@@ -16331,15 +16833,7 @@
                   <a:srgbClr val="E61216"/>
                 </a:solidFill>
               </a:rPr>
-              <a:t>B”</a:t>
-            </a:r>
-            <a:r>
-              <a:rPr lang="en-US" b="1" dirty="0" err="1" smtClean="0">
-                <a:solidFill>
-                  <a:srgbClr val="E61216"/>
-                </a:solidFill>
-              </a:rPr>
-              <a:t>.split</a:t>
+              <a:t>B”.split</a:t>
             </a:r>
             <a:r>
               <a:rPr lang="en-US" b="1" dirty="0" smtClean="0">
@@ -16432,6 +16926,34 @@
                 <a:srgbClr val="E61216"/>
               </a:solidFill>
             </a:endParaRPr>
+          </a:p>
+        </p:txBody>
+      </p:sp>
+      <p:sp>
+        <p:nvSpPr>
+          <p:cNvPr id="14" name="Slide Number Placeholder 3"/>
+          <p:cNvSpPr>
+            <a:spLocks noGrp="1"/>
+          </p:cNvSpPr>
+          <p:nvPr>
+            <p:ph type="sldNum" sz="quarter" idx="12"/>
+          </p:nvPr>
+        </p:nvSpPr>
+        <p:spPr>
+          <a:xfrm>
+            <a:off x="7573895" y="6476235"/>
+            <a:ext cx="505250" cy="498018"/>
+          </a:xfrm>
+        </p:spPr>
+        <p:txBody>
+          <a:bodyPr/>
+          <a:lstStyle/>
+          <a:p>
+            <a:fld id="{D09DAC92-C97B-934B-A404-3E3077E3B66F}" type="slidenum">
+              <a:rPr lang="en-US" sz="2000" smtClean="0"/>
+              <a:t>25</a:t>
+            </a:fld>
+            <a:endParaRPr lang="en-US" sz="2000"/>
           </a:p>
         </p:txBody>
       </p:sp>
@@ -16650,6 +17172,34 @@
               <a:rPr lang="en-US" b="1" dirty="0" smtClean="0"/>
               <a:t>02-expand/</a:t>
             </a:r>
+          </a:p>
+        </p:txBody>
+      </p:sp>
+      <p:sp>
+        <p:nvSpPr>
+          <p:cNvPr id="4" name="Slide Number Placeholder 3"/>
+          <p:cNvSpPr>
+            <a:spLocks noGrp="1"/>
+          </p:cNvSpPr>
+          <p:nvPr>
+            <p:ph type="sldNum" sz="quarter" idx="12"/>
+          </p:nvPr>
+        </p:nvSpPr>
+        <p:spPr>
+          <a:xfrm>
+            <a:off x="7573895" y="6476235"/>
+            <a:ext cx="505250" cy="498018"/>
+          </a:xfrm>
+        </p:spPr>
+        <p:txBody>
+          <a:bodyPr/>
+          <a:lstStyle/>
+          <a:p>
+            <a:fld id="{D09DAC92-C97B-934B-A404-3E3077E3B66F}" type="slidenum">
+              <a:rPr lang="en-US" sz="2000" smtClean="0"/>
+              <a:t>26</a:t>
+            </a:fld>
+            <a:endParaRPr lang="en-US" sz="2000"/>
           </a:p>
         </p:txBody>
       </p:sp>
@@ -17404,24 +17954,36 @@
                   <a:srgbClr val="E61216"/>
                 </a:solidFill>
               </a:rPr>
-              <a:t>We do not really </a:t>
-            </a:r>
-            <a:r>
-              <a:rPr lang="en-US" b="1" dirty="0" smtClean="0">
-                <a:solidFill>
-                  <a:srgbClr val="E61216"/>
-                </a:solidFill>
-              </a:rPr>
-              <a:t>need to keep  </a:t>
-            </a:r>
-            <a:r>
-              <a:rPr lang="en-US" b="1" dirty="0" smtClean="0">
-                <a:solidFill>
-                  <a:srgbClr val="E61216"/>
-                </a:solidFill>
-              </a:rPr>
-              <a:t>this!</a:t>
-            </a:r>
+              <a:t>We do not really need to keep  this!</a:t>
+            </a:r>
+          </a:p>
+        </p:txBody>
+      </p:sp>
+      <p:sp>
+        <p:nvSpPr>
+          <p:cNvPr id="28" name="Slide Number Placeholder 3"/>
+          <p:cNvSpPr>
+            <a:spLocks noGrp="1"/>
+          </p:cNvSpPr>
+          <p:nvPr>
+            <p:ph type="sldNum" sz="quarter" idx="12"/>
+          </p:nvPr>
+        </p:nvSpPr>
+        <p:spPr>
+          <a:xfrm>
+            <a:off x="7573895" y="6476235"/>
+            <a:ext cx="505250" cy="498018"/>
+          </a:xfrm>
+        </p:spPr>
+        <p:txBody>
+          <a:bodyPr/>
+          <a:lstStyle/>
+          <a:p>
+            <a:fld id="{D09DAC92-C97B-934B-A404-3E3077E3B66F}" type="slidenum">
+              <a:rPr lang="en-US" sz="2000" smtClean="0"/>
+              <a:t>27</a:t>
+            </a:fld>
+            <a:endParaRPr lang="en-US" sz="2000"/>
           </a:p>
         </p:txBody>
       </p:sp>
@@ -17660,15 +18222,7 @@
                   <a:srgbClr val="E61216"/>
                 </a:solidFill>
               </a:rPr>
-              <a:t>temp(</a:t>
-            </a:r>
-            <a:r>
-              <a:rPr lang="en-US" b="1" dirty="0" smtClean="0">
-                <a:solidFill>
-                  <a:srgbClr val="E61216"/>
-                </a:solidFill>
-              </a:rPr>
-              <a:t>“</a:t>
+              <a:t>temp(“</a:t>
             </a:r>
             <a:r>
               <a:rPr lang="en-US" b="1" dirty="0" err="1" smtClean="0">
@@ -17835,15 +18389,7 @@
                   <a:srgbClr val="000000"/>
                 </a:solidFill>
               </a:rPr>
-              <a:t>SAMPLES = “</a:t>
-            </a:r>
-            <a:r>
-              <a:rPr lang="en-US" b="1" dirty="0" smtClean="0">
-                <a:solidFill>
-                  <a:srgbClr val="000000"/>
-                </a:solidFill>
-              </a:rPr>
-              <a:t>A </a:t>
+              <a:t>SAMPLES = “A </a:t>
             </a:r>
             <a:r>
               <a:rPr lang="en-US" b="1" dirty="0" err="1" smtClean="0">
@@ -17851,15 +18397,7 @@
                   <a:srgbClr val="000000"/>
                 </a:solidFill>
               </a:rPr>
-              <a:t>B”</a:t>
-            </a:r>
-            <a:r>
-              <a:rPr lang="en-US" b="1" dirty="0" err="1" smtClean="0">
-                <a:solidFill>
-                  <a:srgbClr val="000000"/>
-                </a:solidFill>
-              </a:rPr>
-              <a:t>.split</a:t>
+              <a:t>B”.split</a:t>
             </a:r>
             <a:r>
               <a:rPr lang="en-US" b="1" dirty="0" smtClean="0">
@@ -17952,6 +18490,34 @@
                 <a:srgbClr val="E61216"/>
               </a:solidFill>
             </a:endParaRPr>
+          </a:p>
+        </p:txBody>
+      </p:sp>
+      <p:sp>
+        <p:nvSpPr>
+          <p:cNvPr id="14" name="Slide Number Placeholder 3"/>
+          <p:cNvSpPr>
+            <a:spLocks noGrp="1"/>
+          </p:cNvSpPr>
+          <p:nvPr>
+            <p:ph type="sldNum" sz="quarter" idx="12"/>
+          </p:nvPr>
+        </p:nvSpPr>
+        <p:spPr>
+          <a:xfrm>
+            <a:off x="7573895" y="6476235"/>
+            <a:ext cx="505250" cy="498018"/>
+          </a:xfrm>
+        </p:spPr>
+        <p:txBody>
+          <a:bodyPr/>
+          <a:lstStyle/>
+          <a:p>
+            <a:fld id="{D09DAC92-C97B-934B-A404-3E3077E3B66F}" type="slidenum">
+              <a:rPr lang="en-US" sz="2000" smtClean="0"/>
+              <a:t>28</a:t>
+            </a:fld>
+            <a:endParaRPr lang="en-US" sz="2000" dirty="0"/>
           </a:p>
         </p:txBody>
       </p:sp>
@@ -18303,11 +18869,7 @@
             </a:r>
             <a:r>
               <a:rPr lang="en-US" b="1" dirty="0" smtClean="0"/>
-              <a:t>temp(</a:t>
-            </a:r>
-            <a:r>
-              <a:rPr lang="en-US" b="1" dirty="0" smtClean="0"/>
-              <a:t>“</a:t>
+              <a:t>temp(“</a:t>
             </a:r>
             <a:r>
               <a:rPr lang="en-US" b="1" dirty="0" err="1" smtClean="0"/>
@@ -18500,11 +19062,6 @@
               </a:rPr>
               <a:t>”)</a:t>
             </a:r>
-            <a:endParaRPr lang="en-US" b="1" dirty="0">
-              <a:solidFill>
-                <a:schemeClr val="accent5"/>
-              </a:solidFill>
-            </a:endParaRPr>
           </a:p>
         </p:txBody>
       </p:sp>
@@ -18588,6 +19145,34 @@
                 <a:srgbClr val="E61216"/>
               </a:solidFill>
             </a:endParaRPr>
+          </a:p>
+        </p:txBody>
+      </p:sp>
+      <p:sp>
+        <p:nvSpPr>
+          <p:cNvPr id="14" name="Slide Number Placeholder 3"/>
+          <p:cNvSpPr>
+            <a:spLocks noGrp="1"/>
+          </p:cNvSpPr>
+          <p:nvPr>
+            <p:ph type="sldNum" sz="quarter" idx="12"/>
+          </p:nvPr>
+        </p:nvSpPr>
+        <p:spPr>
+          <a:xfrm>
+            <a:off x="7573895" y="6476235"/>
+            <a:ext cx="505250" cy="498018"/>
+          </a:xfrm>
+        </p:spPr>
+        <p:txBody>
+          <a:bodyPr/>
+          <a:lstStyle/>
+          <a:p>
+            <a:fld id="{D09DAC92-C97B-934B-A404-3E3077E3B66F}" type="slidenum">
+              <a:rPr lang="en-US" sz="2000" smtClean="0"/>
+              <a:t>29</a:t>
+            </a:fld>
+            <a:endParaRPr lang="en-US" sz="2000"/>
           </a:p>
         </p:txBody>
       </p:sp>
@@ -21216,6 +21801,34 @@
           </a:p>
         </p:txBody>
       </p:sp>
+      <p:sp>
+        <p:nvSpPr>
+          <p:cNvPr id="6" name="Slide Number Placeholder 3"/>
+          <p:cNvSpPr>
+            <a:spLocks noGrp="1"/>
+          </p:cNvSpPr>
+          <p:nvPr>
+            <p:ph type="sldNum" sz="quarter" idx="12"/>
+          </p:nvPr>
+        </p:nvSpPr>
+        <p:spPr>
+          <a:xfrm>
+            <a:off x="7573895" y="6476235"/>
+            <a:ext cx="505250" cy="498018"/>
+          </a:xfrm>
+        </p:spPr>
+        <p:txBody>
+          <a:bodyPr/>
+          <a:lstStyle/>
+          <a:p>
+            <a:fld id="{D09DAC92-C97B-934B-A404-3E3077E3B66F}" type="slidenum">
+              <a:rPr lang="en-US" sz="2000" smtClean="0"/>
+              <a:t>30</a:t>
+            </a:fld>
+            <a:endParaRPr lang="en-US" sz="2000"/>
+          </a:p>
+        </p:txBody>
+      </p:sp>
     </p:spTree>
     <p:extLst>
       <p:ext uri="{BB962C8B-B14F-4D97-AF65-F5344CB8AC3E}">
@@ -22146,6 +22759,34 @@
           </p:txBody>
         </p:sp>
       </p:grpSp>
+      <p:sp>
+        <p:nvSpPr>
+          <p:cNvPr id="30" name="Slide Number Placeholder 3"/>
+          <p:cNvSpPr>
+            <a:spLocks noGrp="1"/>
+          </p:cNvSpPr>
+          <p:nvPr>
+            <p:ph type="sldNum" sz="quarter" idx="12"/>
+          </p:nvPr>
+        </p:nvSpPr>
+        <p:spPr>
+          <a:xfrm>
+            <a:off x="7573895" y="6476235"/>
+            <a:ext cx="505250" cy="498018"/>
+          </a:xfrm>
+        </p:spPr>
+        <p:txBody>
+          <a:bodyPr/>
+          <a:lstStyle/>
+          <a:p>
+            <a:fld id="{D09DAC92-C97B-934B-A404-3E3077E3B66F}" type="slidenum">
+              <a:rPr lang="en-US" sz="2000" smtClean="0"/>
+              <a:t>31</a:t>
+            </a:fld>
+            <a:endParaRPr lang="en-US" sz="2000"/>
+          </a:p>
+        </p:txBody>
+      </p:sp>
     </p:spTree>
     <p:extLst>
       <p:ext uri="{BB962C8B-B14F-4D97-AF65-F5344CB8AC3E}">
@@ -22364,6 +23005,34 @@
           </a:p>
         </p:txBody>
       </p:sp>
+      <p:sp>
+        <p:nvSpPr>
+          <p:cNvPr id="4" name="Slide Number Placeholder 3"/>
+          <p:cNvSpPr>
+            <a:spLocks noGrp="1"/>
+          </p:cNvSpPr>
+          <p:nvPr>
+            <p:ph type="sldNum" sz="quarter" idx="12"/>
+          </p:nvPr>
+        </p:nvSpPr>
+        <p:spPr>
+          <a:xfrm>
+            <a:off x="7573895" y="6476235"/>
+            <a:ext cx="505250" cy="498018"/>
+          </a:xfrm>
+        </p:spPr>
+        <p:txBody>
+          <a:bodyPr/>
+          <a:lstStyle/>
+          <a:p>
+            <a:fld id="{D09DAC92-C97B-934B-A404-3E3077E3B66F}" type="slidenum">
+              <a:rPr lang="en-US" sz="2000" smtClean="0"/>
+              <a:t>32</a:t>
+            </a:fld>
+            <a:endParaRPr lang="en-US" sz="2000"/>
+          </a:p>
+        </p:txBody>
+      </p:sp>
     </p:spTree>
     <p:extLst>
       <p:ext uri="{BB962C8B-B14F-4D97-AF65-F5344CB8AC3E}">
@@ -22555,11 +23224,6 @@
               </a:rPr>
               <a:t>”</a:t>
             </a:r>
-            <a:endParaRPr lang="en-US" b="1" dirty="0" smtClean="0">
-              <a:solidFill>
-                <a:srgbClr val="E61216"/>
-              </a:solidFill>
-            </a:endParaRPr>
           </a:p>
         </p:txBody>
       </p:sp>
@@ -22869,6 +23533,34 @@
                 <a:srgbClr val="E61216"/>
               </a:solidFill>
             </a:endParaRPr>
+          </a:p>
+        </p:txBody>
+      </p:sp>
+      <p:sp>
+        <p:nvSpPr>
+          <p:cNvPr id="12" name="Slide Number Placeholder 3"/>
+          <p:cNvSpPr>
+            <a:spLocks noGrp="1"/>
+          </p:cNvSpPr>
+          <p:nvPr>
+            <p:ph type="sldNum" sz="quarter" idx="12"/>
+          </p:nvPr>
+        </p:nvSpPr>
+        <p:spPr>
+          <a:xfrm>
+            <a:off x="7573895" y="6476235"/>
+            <a:ext cx="505250" cy="498018"/>
+          </a:xfrm>
+        </p:spPr>
+        <p:txBody>
+          <a:bodyPr/>
+          <a:lstStyle/>
+          <a:p>
+            <a:fld id="{D09DAC92-C97B-934B-A404-3E3077E3B66F}" type="slidenum">
+              <a:rPr lang="en-US" sz="2000" smtClean="0"/>
+              <a:t>33</a:t>
+            </a:fld>
+            <a:endParaRPr lang="en-US" sz="2000"/>
           </a:p>
         </p:txBody>
       </p:sp>
@@ -23113,6 +23805,34 @@
           </a:p>
         </p:txBody>
       </p:sp>
+      <p:sp>
+        <p:nvSpPr>
+          <p:cNvPr id="4" name="Slide Number Placeholder 3"/>
+          <p:cNvSpPr>
+            <a:spLocks noGrp="1"/>
+          </p:cNvSpPr>
+          <p:nvPr>
+            <p:ph type="sldNum" sz="quarter" idx="12"/>
+          </p:nvPr>
+        </p:nvSpPr>
+        <p:spPr>
+          <a:xfrm>
+            <a:off x="7573895" y="6476235"/>
+            <a:ext cx="505250" cy="498018"/>
+          </a:xfrm>
+        </p:spPr>
+        <p:txBody>
+          <a:bodyPr/>
+          <a:lstStyle/>
+          <a:p>
+            <a:fld id="{D09DAC92-C97B-934B-A404-3E3077E3B66F}" type="slidenum">
+              <a:rPr lang="en-US" sz="2000" smtClean="0"/>
+              <a:t>34</a:t>
+            </a:fld>
+            <a:endParaRPr lang="en-US" sz="2000"/>
+          </a:p>
+        </p:txBody>
+      </p:sp>
     </p:spTree>
     <p:extLst>
       <p:ext uri="{BB962C8B-B14F-4D97-AF65-F5344CB8AC3E}">
@@ -23440,7 +24160,6 @@
               <a:rPr lang="en-US" b="1" dirty="0" smtClean="0"/>
               <a:t>: all, extract</a:t>
             </a:r>
-            <a:endParaRPr lang="en-US" b="1" dirty="0" smtClean="0"/>
           </a:p>
         </p:txBody>
       </p:sp>
@@ -23524,6 +24243,34 @@
                 <a:srgbClr val="E61216"/>
               </a:solidFill>
             </a:endParaRPr>
+          </a:p>
+        </p:txBody>
+      </p:sp>
+      <p:sp>
+        <p:nvSpPr>
+          <p:cNvPr id="12" name="Slide Number Placeholder 3"/>
+          <p:cNvSpPr>
+            <a:spLocks noGrp="1"/>
+          </p:cNvSpPr>
+          <p:nvPr>
+            <p:ph type="sldNum" sz="quarter" idx="12"/>
+          </p:nvPr>
+        </p:nvSpPr>
+        <p:spPr>
+          <a:xfrm>
+            <a:off x="7573895" y="6476235"/>
+            <a:ext cx="505250" cy="498018"/>
+          </a:xfrm>
+        </p:spPr>
+        <p:txBody>
+          <a:bodyPr/>
+          <a:lstStyle/>
+          <a:p>
+            <a:fld id="{D09DAC92-C97B-934B-A404-3E3077E3B66F}" type="slidenum">
+              <a:rPr lang="en-US" sz="2000" smtClean="0"/>
+              <a:t>35</a:t>
+            </a:fld>
+            <a:endParaRPr lang="en-US" sz="2000"/>
           </a:p>
         </p:txBody>
       </p:sp>
@@ -23625,6 +24372,34 @@
               <a:rPr lang="en-US" b="1" dirty="0" smtClean="0"/>
               <a:t>04-cluster/</a:t>
             </a:r>
+          </a:p>
+        </p:txBody>
+      </p:sp>
+      <p:sp>
+        <p:nvSpPr>
+          <p:cNvPr id="4" name="Slide Number Placeholder 3"/>
+          <p:cNvSpPr>
+            <a:spLocks noGrp="1"/>
+          </p:cNvSpPr>
+          <p:nvPr>
+            <p:ph type="sldNum" sz="quarter" idx="12"/>
+          </p:nvPr>
+        </p:nvSpPr>
+        <p:spPr>
+          <a:xfrm>
+            <a:off x="7573895" y="6476235"/>
+            <a:ext cx="505250" cy="498018"/>
+          </a:xfrm>
+        </p:spPr>
+        <p:txBody>
+          <a:bodyPr/>
+          <a:lstStyle/>
+          <a:p>
+            <a:fld id="{D09DAC92-C97B-934B-A404-3E3077E3B66F}" type="slidenum">
+              <a:rPr lang="en-US" sz="2000" smtClean="0"/>
+              <a:t>36</a:t>
+            </a:fld>
+            <a:endParaRPr lang="en-US" sz="2000"/>
           </a:p>
         </p:txBody>
       </p:sp>
@@ -23744,12 +24519,49 @@
             </a:pPr>
             <a:r>
               <a:rPr lang="en-US" dirty="0" smtClean="0"/>
-              <a:t>Folder  </a:t>
-            </a:r>
+              <a:t>Please use folder </a:t>
+            </a:r>
+          </a:p>
+          <a:p>
+            <a:pPr marL="0" indent="0" algn="ctr">
+              <a:buNone/>
+            </a:pPr>
             <a:r>
               <a:rPr lang="en-US" b="1" dirty="0" smtClean="0"/>
-              <a:t>05-foreach/</a:t>
-            </a:r>
+              <a:t>05</a:t>
+            </a:r>
+            <a:r>
+              <a:rPr lang="en-US" b="1" dirty="0" smtClean="0"/>
+              <a:t>-foreach/</a:t>
+            </a:r>
+          </a:p>
+        </p:txBody>
+      </p:sp>
+      <p:sp>
+        <p:nvSpPr>
+          <p:cNvPr id="6" name="Slide Number Placeholder 3"/>
+          <p:cNvSpPr>
+            <a:spLocks noGrp="1"/>
+          </p:cNvSpPr>
+          <p:nvPr>
+            <p:ph type="sldNum" sz="quarter" idx="12"/>
+          </p:nvPr>
+        </p:nvSpPr>
+        <p:spPr>
+          <a:xfrm>
+            <a:off x="7573895" y="6476235"/>
+            <a:ext cx="505250" cy="498018"/>
+          </a:xfrm>
+        </p:spPr>
+        <p:txBody>
+          <a:bodyPr/>
+          <a:lstStyle/>
+          <a:p>
+            <a:fld id="{D09DAC92-C97B-934B-A404-3E3077E3B66F}" type="slidenum">
+              <a:rPr lang="en-US" sz="2000" smtClean="0"/>
+              <a:t>37</a:t>
+            </a:fld>
+            <a:endParaRPr lang="en-US" sz="2000"/>
           </a:p>
         </p:txBody>
       </p:sp>
@@ -24002,11 +24814,7 @@
             </a:r>
             <a:r>
               <a:rPr lang="en-US" b="1" dirty="0" err="1" smtClean="0"/>
-              <a:t>sum</a:t>
-            </a:r>
-            <a:r>
-              <a:rPr lang="en-US" b="1" dirty="0" err="1" smtClean="0"/>
-              <a:t>.txt</a:t>
+              <a:t>sum.txt</a:t>
             </a:r>
             <a:r>
               <a:rPr lang="en-US" b="1" dirty="0" smtClean="0"/>
@@ -24340,6 +25148,34 @@
           </p:txBody>
         </p:sp>
       </p:grpSp>
+      <p:sp>
+        <p:nvSpPr>
+          <p:cNvPr id="17" name="Slide Number Placeholder 3"/>
+          <p:cNvSpPr>
+            <a:spLocks noGrp="1"/>
+          </p:cNvSpPr>
+          <p:nvPr>
+            <p:ph type="sldNum" sz="quarter" idx="12"/>
+          </p:nvPr>
+        </p:nvSpPr>
+        <p:spPr>
+          <a:xfrm>
+            <a:off x="7573895" y="6476235"/>
+            <a:ext cx="505250" cy="498018"/>
+          </a:xfrm>
+        </p:spPr>
+        <p:txBody>
+          <a:bodyPr/>
+          <a:lstStyle/>
+          <a:p>
+            <a:fld id="{D09DAC92-C97B-934B-A404-3E3077E3B66F}" type="slidenum">
+              <a:rPr lang="en-US" sz="2000" smtClean="0"/>
+              <a:t>38</a:t>
+            </a:fld>
+            <a:endParaRPr lang="en-US" sz="2000"/>
+          </a:p>
+        </p:txBody>
+      </p:sp>
     </p:spTree>
     <p:extLst>
       <p:ext uri="{BB962C8B-B14F-4D97-AF65-F5344CB8AC3E}">
@@ -25060,6 +25896,34 @@
           </p:txBody>
         </p:sp>
       </p:grpSp>
+      <p:sp>
+        <p:nvSpPr>
+          <p:cNvPr id="30" name="Slide Number Placeholder 3"/>
+          <p:cNvSpPr>
+            <a:spLocks noGrp="1"/>
+          </p:cNvSpPr>
+          <p:nvPr>
+            <p:ph type="sldNum" sz="quarter" idx="12"/>
+          </p:nvPr>
+        </p:nvSpPr>
+        <p:spPr>
+          <a:xfrm>
+            <a:off x="7573895" y="6476235"/>
+            <a:ext cx="505250" cy="498018"/>
+          </a:xfrm>
+        </p:spPr>
+        <p:txBody>
+          <a:bodyPr/>
+          <a:lstStyle/>
+          <a:p>
+            <a:fld id="{D09DAC92-C97B-934B-A404-3E3077E3B66F}" type="slidenum">
+              <a:rPr lang="en-US" sz="2000" smtClean="0"/>
+              <a:t>39</a:t>
+            </a:fld>
+            <a:endParaRPr lang="en-US" sz="2000"/>
+          </a:p>
+        </p:txBody>
+      </p:sp>
     </p:spTree>
     <p:extLst>
       <p:ext uri="{BB962C8B-B14F-4D97-AF65-F5344CB8AC3E}">
@@ -29080,6 +29944,34 @@
           </p:txBody>
         </p:sp>
       </p:grpSp>
+      <p:sp>
+        <p:nvSpPr>
+          <p:cNvPr id="34" name="Slide Number Placeholder 3"/>
+          <p:cNvSpPr>
+            <a:spLocks noGrp="1"/>
+          </p:cNvSpPr>
+          <p:nvPr>
+            <p:ph type="sldNum" sz="quarter" idx="12"/>
+          </p:nvPr>
+        </p:nvSpPr>
+        <p:spPr>
+          <a:xfrm>
+            <a:off x="7573895" y="6476235"/>
+            <a:ext cx="505250" cy="498018"/>
+          </a:xfrm>
+        </p:spPr>
+        <p:txBody>
+          <a:bodyPr/>
+          <a:lstStyle/>
+          <a:p>
+            <a:fld id="{D09DAC92-C97B-934B-A404-3E3077E3B66F}" type="slidenum">
+              <a:rPr lang="en-US" sz="2000" smtClean="0"/>
+              <a:t>40</a:t>
+            </a:fld>
+            <a:endParaRPr lang="en-US" sz="2000"/>
+          </a:p>
+        </p:txBody>
+      </p:sp>
     </p:spTree>
     <p:extLst>
       <p:ext uri="{BB962C8B-B14F-4D97-AF65-F5344CB8AC3E}">
@@ -29424,6 +30316,117 @@
           </a:p>
         </p:txBody>
       </p:sp>
+      <p:sp>
+        <p:nvSpPr>
+          <p:cNvPr id="7" name="Rectangle 6"/>
+          <p:cNvSpPr/>
+          <p:nvPr/>
+        </p:nvSpPr>
+        <p:spPr>
+          <a:xfrm>
+            <a:off x="660278" y="1434521"/>
+            <a:ext cx="7491997" cy="4628101"/>
+          </a:xfrm>
+          <a:prstGeom prst="rect">
+            <a:avLst/>
+          </a:prstGeom>
+          <a:noFill/>
+          <a:ln>
+            <a:solidFill>
+              <a:schemeClr val="accent5"/>
+            </a:solidFill>
+          </a:ln>
+          <a:effectLst/>
+        </p:spPr>
+        <p:style>
+          <a:lnRef idx="1">
+            <a:schemeClr val="accent1"/>
+          </a:lnRef>
+          <a:fillRef idx="3">
+            <a:schemeClr val="accent1"/>
+          </a:fillRef>
+          <a:effectRef idx="2">
+            <a:schemeClr val="accent1"/>
+          </a:effectRef>
+          <a:fontRef idx="minor">
+            <a:schemeClr val="lt1"/>
+          </a:fontRef>
+        </p:style>
+        <p:txBody>
+          <a:bodyPr rtlCol="0" anchor="ctr"/>
+          <a:lstStyle/>
+          <a:p>
+            <a:pPr algn="ctr"/>
+            <a:endParaRPr lang="en-US" dirty="0"/>
+          </a:p>
+        </p:txBody>
+      </p:sp>
+      <p:sp>
+        <p:nvSpPr>
+          <p:cNvPr id="8" name="TextBox 7"/>
+          <p:cNvSpPr txBox="1"/>
+          <p:nvPr/>
+        </p:nvSpPr>
+        <p:spPr>
+          <a:xfrm>
+            <a:off x="7308281" y="1131408"/>
+            <a:ext cx="872041" cy="307777"/>
+          </a:xfrm>
+          <a:prstGeom prst="rect">
+            <a:avLst/>
+          </a:prstGeom>
+          <a:noFill/>
+        </p:spPr>
+        <p:txBody>
+          <a:bodyPr wrap="none" rtlCol="0">
+            <a:spAutoFit/>
+          </a:bodyPr>
+          <a:lstStyle/>
+          <a:p>
+            <a:r>
+              <a:rPr lang="en-US" sz="1400" dirty="0" err="1" smtClean="0">
+                <a:solidFill>
+                  <a:srgbClr val="E61216"/>
+                </a:solidFill>
+              </a:rPr>
+              <a:t>Snakefile</a:t>
+            </a:r>
+            <a:endParaRPr lang="en-US" sz="1400" dirty="0">
+              <a:solidFill>
+                <a:srgbClr val="E61216"/>
+              </a:solidFill>
+            </a:endParaRPr>
+          </a:p>
+        </p:txBody>
+      </p:sp>
+      <p:sp>
+        <p:nvSpPr>
+          <p:cNvPr id="9" name="Slide Number Placeholder 3"/>
+          <p:cNvSpPr>
+            <a:spLocks noGrp="1"/>
+          </p:cNvSpPr>
+          <p:nvPr>
+            <p:ph type="sldNum" sz="quarter" idx="12"/>
+          </p:nvPr>
+        </p:nvSpPr>
+        <p:spPr>
+          <a:xfrm>
+            <a:off x="7573895" y="6476235"/>
+            <a:ext cx="505250" cy="498018"/>
+          </a:xfrm>
+        </p:spPr>
+        <p:txBody>
+          <a:bodyPr/>
+          <a:lstStyle/>
+          <a:p>
+            <a:fld id="{D09DAC92-C97B-934B-A404-3E3077E3B66F}" type="slidenum">
+              <a:rPr lang="en-US" sz="2000" smtClean="0"/>
+              <a:t>41</a:t>
+            </a:fld>
+            <a:endParaRPr lang="en-US" sz="2000"/>
+          </a:p>
+        </p:txBody>
+      </p:sp>
     </p:spTree>
     <p:extLst>
       <p:ext uri="{BB962C8B-B14F-4D97-AF65-F5344CB8AC3E}">
@@ -29836,14 +30839,59 @@
       </p:sp>
       <p:sp>
         <p:nvSpPr>
-          <p:cNvPr id="12" name="TextBox 11"/>
+          <p:cNvPr id="15" name="Rectangle 14"/>
+          <p:cNvSpPr/>
+          <p:nvPr/>
+        </p:nvSpPr>
+        <p:spPr>
+          <a:xfrm>
+            <a:off x="660278" y="1434521"/>
+            <a:ext cx="7491997" cy="4628101"/>
+          </a:xfrm>
+          <a:prstGeom prst="rect">
+            <a:avLst/>
+          </a:prstGeom>
+          <a:noFill/>
+          <a:ln>
+            <a:solidFill>
+              <a:schemeClr val="accent5"/>
+            </a:solidFill>
+          </a:ln>
+          <a:effectLst/>
+        </p:spPr>
+        <p:style>
+          <a:lnRef idx="1">
+            <a:schemeClr val="accent1"/>
+          </a:lnRef>
+          <a:fillRef idx="3">
+            <a:schemeClr val="accent1"/>
+          </a:fillRef>
+          <a:effectRef idx="2">
+            <a:schemeClr val="accent1"/>
+          </a:effectRef>
+          <a:fontRef idx="minor">
+            <a:schemeClr val="lt1"/>
+          </a:fontRef>
+        </p:style>
+        <p:txBody>
+          <a:bodyPr rtlCol="0" anchor="ctr"/>
+          <a:lstStyle/>
+          <a:p>
+            <a:pPr algn="ctr"/>
+            <a:endParaRPr lang="en-US" dirty="0"/>
+          </a:p>
+        </p:txBody>
+      </p:sp>
+      <p:sp>
+        <p:nvSpPr>
+          <p:cNvPr id="16" name="TextBox 15"/>
           <p:cNvSpPr txBox="1"/>
           <p:nvPr/>
         </p:nvSpPr>
         <p:spPr>
           <a:xfrm>
-            <a:off x="5849267" y="4185062"/>
-            <a:ext cx="2177449" cy="523220"/>
+            <a:off x="7308281" y="1131408"/>
+            <a:ext cx="872041" cy="307777"/>
           </a:xfrm>
           <a:prstGeom prst="rect">
             <a:avLst/>
@@ -29857,18 +30905,46 @@
           <a:lstStyle/>
           <a:p>
             <a:r>
-              <a:rPr lang="en-US" sz="2800" b="1" dirty="0" smtClean="0">
+              <a:rPr lang="en-US" sz="1400" dirty="0" err="1" smtClean="0">
                 <a:solidFill>
-                  <a:srgbClr val="7F7F7F"/>
+                  <a:srgbClr val="E61216"/>
                 </a:solidFill>
               </a:rPr>
-              <a:t>&gt; </a:t>
-            </a:r>
-            <a:r>
-              <a:rPr lang="en-US" sz="2800" b="1" dirty="0" err="1" smtClean="0"/>
-              <a:t>snakemake</a:t>
-            </a:r>
-            <a:endParaRPr lang="en-US" sz="2800" b="1" dirty="0"/>
+              <a:t>Snakefile</a:t>
+            </a:r>
+            <a:endParaRPr lang="en-US" sz="1400" dirty="0">
+              <a:solidFill>
+                <a:srgbClr val="E61216"/>
+              </a:solidFill>
+            </a:endParaRPr>
+          </a:p>
+        </p:txBody>
+      </p:sp>
+      <p:sp>
+        <p:nvSpPr>
+          <p:cNvPr id="17" name="Slide Number Placeholder 3"/>
+          <p:cNvSpPr>
+            <a:spLocks noGrp="1"/>
+          </p:cNvSpPr>
+          <p:nvPr>
+            <p:ph type="sldNum" sz="quarter" idx="12"/>
+          </p:nvPr>
+        </p:nvSpPr>
+        <p:spPr>
+          <a:xfrm>
+            <a:off x="7573895" y="6476235"/>
+            <a:ext cx="505250" cy="498018"/>
+          </a:xfrm>
+        </p:spPr>
+        <p:txBody>
+          <a:bodyPr/>
+          <a:lstStyle/>
+          <a:p>
+            <a:fld id="{D09DAC92-C97B-934B-A404-3E3077E3B66F}" type="slidenum">
+              <a:rPr lang="en-US" sz="2000" smtClean="0"/>
+              <a:t>42</a:t>
+            </a:fld>
+            <a:endParaRPr lang="en-US" sz="2000"/>
           </a:p>
         </p:txBody>
       </p:sp>
@@ -29885,126 +30961,9 @@
   <p:timing>
     <p:tnLst>
       <p:par>
-        <p:cTn xmlns:p14="http://schemas.microsoft.com/office/powerpoint/2010/main" id="1" dur="indefinite" restart="never" nodeType="tmRoot">
-          <p:childTnLst>
-            <p:seq concurrent="1" nextAc="seek">
-              <p:cTn id="2" dur="indefinite" nodeType="mainSeq">
-                <p:childTnLst>
-                  <p:par>
-                    <p:cTn id="3" fill="hold">
-                      <p:stCondLst>
-                        <p:cond delay="indefinite"/>
-                      </p:stCondLst>
-                      <p:childTnLst>
-                        <p:par>
-                          <p:cTn id="4" fill="hold">
-                            <p:stCondLst>
-                              <p:cond delay="0"/>
-                            </p:stCondLst>
-                            <p:childTnLst>
-                              <p:par>
-                                <p:cTn id="5" presetID="1" presetClass="entr" presetSubtype="0" fill="hold" grpId="0" nodeType="clickEffect">
-                                  <p:stCondLst>
-                                    <p:cond delay="0"/>
-                                  </p:stCondLst>
-                                  <p:childTnLst>
-                                    <p:set>
-                                      <p:cBhvr>
-                                        <p:cTn id="6" dur="1" fill="hold">
-                                          <p:stCondLst>
-                                            <p:cond delay="0"/>
-                                          </p:stCondLst>
-                                        </p:cTn>
-                                        <p:tgtEl>
-                                          <p:spTgt spid="12"/>
-                                        </p:tgtEl>
-                                        <p:attrNameLst>
-                                          <p:attrName>style.visibility</p:attrName>
-                                        </p:attrNameLst>
-                                      </p:cBhvr>
-                                      <p:to>
-                                        <p:strVal val="visible"/>
-                                      </p:to>
-                                    </p:set>
-                                  </p:childTnLst>
-                                </p:cTn>
-                              </p:par>
-                            </p:childTnLst>
-                          </p:cTn>
-                        </p:par>
-                      </p:childTnLst>
-                    </p:cTn>
-                  </p:par>
-                  <p:par>
-                    <p:cTn id="7" fill="hold">
-                      <p:stCondLst>
-                        <p:cond delay="indefinite"/>
-                      </p:stCondLst>
-                      <p:childTnLst>
-                        <p:par>
-                          <p:cTn id="8" fill="hold">
-                            <p:stCondLst>
-                              <p:cond delay="0"/>
-                            </p:stCondLst>
-                            <p:childTnLst>
-                              <p:par>
-                                <p:cTn id="9" presetID="1" presetClass="entr" presetSubtype="0" fill="hold" grpId="1" nodeType="clickEffect">
-                                  <p:stCondLst>
-                                    <p:cond delay="0"/>
-                                  </p:stCondLst>
-                                  <p:childTnLst>
-                                    <p:set>
-                                      <p:cBhvr>
-                                        <p:cTn id="10" dur="1" fill="hold">
-                                          <p:stCondLst>
-                                            <p:cond delay="0"/>
-                                          </p:stCondLst>
-                                        </p:cTn>
-                                        <p:tgtEl>
-                                          <p:spTgt spid="12"/>
-                                        </p:tgtEl>
-                                        <p:attrNameLst>
-                                          <p:attrName>style.visibility</p:attrName>
-                                        </p:attrNameLst>
-                                      </p:cBhvr>
-                                      <p:to>
-                                        <p:strVal val="visible"/>
-                                      </p:to>
-                                    </p:set>
-                                  </p:childTnLst>
-                                </p:cTn>
-                              </p:par>
-                            </p:childTnLst>
-                          </p:cTn>
-                        </p:par>
-                      </p:childTnLst>
-                    </p:cTn>
-                  </p:par>
-                </p:childTnLst>
-              </p:cTn>
-              <p:prevCondLst>
-                <p:cond evt="onPrev" delay="0">
-                  <p:tgtEl>
-                    <p:sldTgt/>
-                  </p:tgtEl>
-                </p:cond>
-              </p:prevCondLst>
-              <p:nextCondLst>
-                <p:cond evt="onNext" delay="0">
-                  <p:tgtEl>
-                    <p:sldTgt/>
-                  </p:tgtEl>
-                </p:cond>
-              </p:nextCondLst>
-            </p:seq>
-          </p:childTnLst>
-        </p:cTn>
+        <p:cTn xmlns:p14="http://schemas.microsoft.com/office/powerpoint/2010/main" id="1" dur="indefinite" restart="never" nodeType="tmRoot"/>
       </p:par>
     </p:tnLst>
-    <p:bldLst>
-      <p:bldP spid="12" grpId="0"/>
-      <p:bldP spid="12" grpId="1"/>
-    </p:bldLst>
   </p:timing>
 </p:sld>
 </file>
@@ -30216,6 +31175,34 @@
               <a:rPr lang="en-US" b="1" dirty="0" smtClean="0"/>
               <a:t>06-foreach-complete/</a:t>
             </a:r>
+          </a:p>
+        </p:txBody>
+      </p:sp>
+      <p:sp>
+        <p:nvSpPr>
+          <p:cNvPr id="7" name="Slide Number Placeholder 3"/>
+          <p:cNvSpPr>
+            <a:spLocks noGrp="1"/>
+          </p:cNvSpPr>
+          <p:nvPr>
+            <p:ph type="sldNum" sz="quarter" idx="12"/>
+          </p:nvPr>
+        </p:nvSpPr>
+        <p:spPr>
+          <a:xfrm>
+            <a:off x="7573895" y="6476235"/>
+            <a:ext cx="505250" cy="498018"/>
+          </a:xfrm>
+        </p:spPr>
+        <p:txBody>
+          <a:bodyPr/>
+          <a:lstStyle/>
+          <a:p>
+            <a:fld id="{D09DAC92-C97B-934B-A404-3E3077E3B66F}" type="slidenum">
+              <a:rPr lang="en-US" sz="2000" smtClean="0"/>
+              <a:t>43</a:t>
+            </a:fld>
+            <a:endParaRPr lang="en-US" sz="2000"/>
           </a:p>
         </p:txBody>
       </p:sp>
@@ -30655,13 +31642,25 @@
           <a:p>
             <a:r>
               <a:rPr lang="en-US" dirty="0" smtClean="0"/>
-              <a:t>Workflow sharing</a:t>
-            </a:r>
-          </a:p>
-          <a:p>
+              <a:t>Sub </a:t>
+            </a:r>
+            <a:r>
+              <a:rPr lang="en-US" dirty="0" err="1"/>
+              <a:t>wWorkflow</a:t>
+            </a:r>
+            <a:r>
+              <a:rPr lang="en-US" dirty="0"/>
+              <a:t> sharing</a:t>
+            </a:r>
+          </a:p>
+          <a:p>
+            <a:r>
+              <a:rPr lang="en-US" dirty="0" err="1" smtClean="0"/>
+              <a:t>orkflows</a:t>
+            </a:r>
             <a:r>
               <a:rPr lang="en-US" dirty="0" smtClean="0"/>
-              <a:t>Sub workflows </a:t>
+              <a:t> </a:t>
             </a:r>
             <a:r>
               <a:rPr lang="en-US" dirty="0" err="1" smtClean="0"/>
@@ -31669,7 +32668,7 @@
                                           </p:stCondLst>
                                         </p:cTn>
                                         <p:tgtEl>
-                                          <p:spTgt spid="19"/>
+                                          <p:spTgt spid="16"/>
                                         </p:tgtEl>
                                         <p:attrNameLst>
                                           <p:attrName>style.visibility</p:attrName>
@@ -31714,7 +32713,7 @@
                                           </p:stCondLst>
                                         </p:cTn>
                                         <p:tgtEl>
-                                          <p:spTgt spid="16"/>
+                                          <p:spTgt spid="19"/>
                                         </p:tgtEl>
                                         <p:attrNameLst>
                                           <p:attrName>style.visibility</p:attrName>
@@ -36530,4 +37529,324 @@
   </a:objectDefaults>
   <a:extraClrSchemeLst/>
 </a:theme>
+</file>
+
+<file path=ppt/theme/theme3.xml><?xml version="1.0" encoding="utf-8"?>
+<a:theme xmlns:a="http://schemas.openxmlformats.org/drawingml/2006/main" name="Office Theme">
+  <a:themeElements>
+    <a:clrScheme name="Office">
+      <a:dk1>
+        <a:sysClr val="windowText" lastClr="000000"/>
+      </a:dk1>
+      <a:lt1>
+        <a:sysClr val="window" lastClr="FFFFFF"/>
+      </a:lt1>
+      <a:dk2>
+        <a:srgbClr val="1F497D"/>
+      </a:dk2>
+      <a:lt2>
+        <a:srgbClr val="EEECE1"/>
+      </a:lt2>
+      <a:accent1>
+        <a:srgbClr val="4F81BD"/>
+      </a:accent1>
+      <a:accent2>
+        <a:srgbClr val="C0504D"/>
+      </a:accent2>
+      <a:accent3>
+        <a:srgbClr val="9BBB59"/>
+      </a:accent3>
+      <a:accent4>
+        <a:srgbClr val="8064A2"/>
+      </a:accent4>
+      <a:accent5>
+        <a:srgbClr val="4BACC6"/>
+      </a:accent5>
+      <a:accent6>
+        <a:srgbClr val="F79646"/>
+      </a:accent6>
+      <a:hlink>
+        <a:srgbClr val="0000FF"/>
+      </a:hlink>
+      <a:folHlink>
+        <a:srgbClr val="800080"/>
+      </a:folHlink>
+    </a:clrScheme>
+    <a:fontScheme name="Office">
+      <a:majorFont>
+        <a:latin typeface="Calibri"/>
+        <a:ea typeface=""/>
+        <a:cs typeface=""/>
+        <a:font script="Jpan" typeface="ＭＳ Ｐゴシック"/>
+        <a:font script="Hang" typeface="맑은 고딕"/>
+        <a:font script="Hans" typeface="宋体"/>
+        <a:font script="Hant" typeface="新細明體"/>
+        <a:font script="Arab" typeface="Times New Roman"/>
+        <a:font script="Hebr" typeface="Times New Roman"/>
+        <a:font script="Thai" typeface="Angsana New"/>
+        <a:font script="Ethi" typeface="Nyala"/>
+        <a:font script="Beng" typeface="Vrinda"/>
+        <a:font script="Gujr" typeface="Shruti"/>
+        <a:font script="Khmr" typeface="MoolBoran"/>
+        <a:font script="Knda" typeface="Tunga"/>
+        <a:font script="Guru" typeface="Raavi"/>
+        <a:font script="Cans" typeface="Euphemia"/>
+        <a:font script="Cher" typeface="Plantagenet Cherokee"/>
+        <a:font script="Yiii" typeface="Microsoft Yi Baiti"/>
+        <a:font script="Tibt" typeface="Microsoft Himalaya"/>
+        <a:font script="Thaa" typeface="MV Boli"/>
+        <a:font script="Deva" typeface="Mangal"/>
+        <a:font script="Telu" typeface="Gautami"/>
+        <a:font script="Taml" typeface="Latha"/>
+        <a:font script="Syrc" typeface="Estrangelo Edessa"/>
+        <a:font script="Orya" typeface="Kalinga"/>
+        <a:font script="Mlym" typeface="Kartika"/>
+        <a:font script="Laoo" typeface="DokChampa"/>
+        <a:font script="Sinh" typeface="Iskoola Pota"/>
+        <a:font script="Mong" typeface="Mongolian Baiti"/>
+        <a:font script="Viet" typeface="Times New Roman"/>
+        <a:font script="Uigh" typeface="Microsoft Uighur"/>
+        <a:font script="Geor" typeface="Sylfaen"/>
+      </a:majorFont>
+      <a:minorFont>
+        <a:latin typeface="Calibri"/>
+        <a:ea typeface=""/>
+        <a:cs typeface=""/>
+        <a:font script="Jpan" typeface="ＭＳ Ｐゴシック"/>
+        <a:font script="Hang" typeface="맑은 고딕"/>
+        <a:font script="Hans" typeface="宋体"/>
+        <a:font script="Hant" typeface="新細明體"/>
+        <a:font script="Arab" typeface="Arial"/>
+        <a:font script="Hebr" typeface="Arial"/>
+        <a:font script="Thai" typeface="Cordia New"/>
+        <a:font script="Ethi" typeface="Nyala"/>
+        <a:font script="Beng" typeface="Vrinda"/>
+        <a:font script="Gujr" typeface="Shruti"/>
+        <a:font script="Khmr" typeface="DaunPenh"/>
+        <a:font script="Knda" typeface="Tunga"/>
+        <a:font script="Guru" typeface="Raavi"/>
+        <a:font script="Cans" typeface="Euphemia"/>
+        <a:font script="Cher" typeface="Plantagenet Cherokee"/>
+        <a:font script="Yiii" typeface="Microsoft Yi Baiti"/>
+        <a:font script="Tibt" typeface="Microsoft Himalaya"/>
+        <a:font script="Thaa" typeface="MV Boli"/>
+        <a:font script="Deva" typeface="Mangal"/>
+        <a:font script="Telu" typeface="Gautami"/>
+        <a:font script="Taml" typeface="Latha"/>
+        <a:font script="Syrc" typeface="Estrangelo Edessa"/>
+        <a:font script="Orya" typeface="Kalinga"/>
+        <a:font script="Mlym" typeface="Kartika"/>
+        <a:font script="Laoo" typeface="DokChampa"/>
+        <a:font script="Sinh" typeface="Iskoola Pota"/>
+        <a:font script="Mong" typeface="Mongolian Baiti"/>
+        <a:font script="Viet" typeface="Arial"/>
+        <a:font script="Uigh" typeface="Microsoft Uighur"/>
+        <a:font script="Geor" typeface="Sylfaen"/>
+      </a:minorFont>
+    </a:fontScheme>
+    <a:fmtScheme name="Office">
+      <a:fillStyleLst>
+        <a:solidFill>
+          <a:schemeClr val="phClr"/>
+        </a:solidFill>
+        <a:gradFill rotWithShape="1">
+          <a:gsLst>
+            <a:gs pos="0">
+              <a:schemeClr val="phClr">
+                <a:tint val="50000"/>
+                <a:satMod val="300000"/>
+              </a:schemeClr>
+            </a:gs>
+            <a:gs pos="35000">
+              <a:schemeClr val="phClr">
+                <a:tint val="37000"/>
+                <a:satMod val="300000"/>
+              </a:schemeClr>
+            </a:gs>
+            <a:gs pos="100000">
+              <a:schemeClr val="phClr">
+                <a:tint val="15000"/>
+                <a:satMod val="350000"/>
+              </a:schemeClr>
+            </a:gs>
+          </a:gsLst>
+          <a:lin ang="16200000" scaled="1"/>
+        </a:gradFill>
+        <a:gradFill rotWithShape="1">
+          <a:gsLst>
+            <a:gs pos="0">
+              <a:schemeClr val="phClr">
+                <a:tint val="100000"/>
+                <a:shade val="100000"/>
+                <a:satMod val="130000"/>
+              </a:schemeClr>
+            </a:gs>
+            <a:gs pos="100000">
+              <a:schemeClr val="phClr">
+                <a:tint val="50000"/>
+                <a:shade val="100000"/>
+                <a:satMod val="350000"/>
+              </a:schemeClr>
+            </a:gs>
+          </a:gsLst>
+          <a:lin ang="16200000" scaled="0"/>
+        </a:gradFill>
+      </a:fillStyleLst>
+      <a:lnStyleLst>
+        <a:ln w="9525" cap="flat" cmpd="sng" algn="ctr">
+          <a:solidFill>
+            <a:schemeClr val="phClr">
+              <a:shade val="95000"/>
+              <a:satMod val="105000"/>
+            </a:schemeClr>
+          </a:solidFill>
+          <a:prstDash val="solid"/>
+        </a:ln>
+        <a:ln w="25400" cap="flat" cmpd="sng" algn="ctr">
+          <a:solidFill>
+            <a:schemeClr val="phClr"/>
+          </a:solidFill>
+          <a:prstDash val="solid"/>
+        </a:ln>
+        <a:ln w="38100" cap="flat" cmpd="sng" algn="ctr">
+          <a:solidFill>
+            <a:schemeClr val="phClr"/>
+          </a:solidFill>
+          <a:prstDash val="solid"/>
+        </a:ln>
+      </a:lnStyleLst>
+      <a:effectStyleLst>
+        <a:effectStyle>
+          <a:effectLst>
+            <a:outerShdw blurRad="40000" dist="20000" dir="5400000" rotWithShape="0">
+              <a:srgbClr val="000000">
+                <a:alpha val="38000"/>
+              </a:srgbClr>
+            </a:outerShdw>
+          </a:effectLst>
+        </a:effectStyle>
+        <a:effectStyle>
+          <a:effectLst>
+            <a:outerShdw blurRad="40000" dist="23000" dir="5400000" rotWithShape="0">
+              <a:srgbClr val="000000">
+                <a:alpha val="35000"/>
+              </a:srgbClr>
+            </a:outerShdw>
+          </a:effectLst>
+        </a:effectStyle>
+        <a:effectStyle>
+          <a:effectLst>
+            <a:outerShdw blurRad="40000" dist="23000" dir="5400000" rotWithShape="0">
+              <a:srgbClr val="000000">
+                <a:alpha val="35000"/>
+              </a:srgbClr>
+            </a:outerShdw>
+          </a:effectLst>
+          <a:scene3d>
+            <a:camera prst="orthographicFront">
+              <a:rot lat="0" lon="0" rev="0"/>
+            </a:camera>
+            <a:lightRig rig="threePt" dir="t">
+              <a:rot lat="0" lon="0" rev="1200000"/>
+            </a:lightRig>
+          </a:scene3d>
+          <a:sp3d>
+            <a:bevelT w="63500" h="25400"/>
+          </a:sp3d>
+        </a:effectStyle>
+      </a:effectStyleLst>
+      <a:bgFillStyleLst>
+        <a:solidFill>
+          <a:schemeClr val="phClr"/>
+        </a:solidFill>
+        <a:gradFill rotWithShape="1">
+          <a:gsLst>
+            <a:gs pos="0">
+              <a:schemeClr val="phClr">
+                <a:tint val="40000"/>
+                <a:satMod val="350000"/>
+              </a:schemeClr>
+            </a:gs>
+            <a:gs pos="40000">
+              <a:schemeClr val="phClr">
+                <a:tint val="45000"/>
+                <a:shade val="99000"/>
+                <a:satMod val="350000"/>
+              </a:schemeClr>
+            </a:gs>
+            <a:gs pos="100000">
+              <a:schemeClr val="phClr">
+                <a:shade val="20000"/>
+                <a:satMod val="255000"/>
+              </a:schemeClr>
+            </a:gs>
+          </a:gsLst>
+          <a:path path="circle">
+            <a:fillToRect l="50000" t="-80000" r="50000" b="180000"/>
+          </a:path>
+        </a:gradFill>
+        <a:gradFill rotWithShape="1">
+          <a:gsLst>
+            <a:gs pos="0">
+              <a:schemeClr val="phClr">
+                <a:tint val="80000"/>
+                <a:satMod val="300000"/>
+              </a:schemeClr>
+            </a:gs>
+            <a:gs pos="100000">
+              <a:schemeClr val="phClr">
+                <a:shade val="30000"/>
+                <a:satMod val="200000"/>
+              </a:schemeClr>
+            </a:gs>
+          </a:gsLst>
+          <a:path path="circle">
+            <a:fillToRect l="50000" t="50000" r="50000" b="50000"/>
+          </a:path>
+        </a:gradFill>
+      </a:bgFillStyleLst>
+    </a:fmtScheme>
+  </a:themeElements>
+  <a:objectDefaults>
+    <a:spDef>
+      <a:spPr/>
+      <a:bodyPr/>
+      <a:lstStyle/>
+      <a:style>
+        <a:lnRef idx="1">
+          <a:schemeClr val="accent1"/>
+        </a:lnRef>
+        <a:fillRef idx="3">
+          <a:schemeClr val="accent1"/>
+        </a:fillRef>
+        <a:effectRef idx="2">
+          <a:schemeClr val="accent1"/>
+        </a:effectRef>
+        <a:fontRef idx="minor">
+          <a:schemeClr val="lt1"/>
+        </a:fontRef>
+      </a:style>
+    </a:spDef>
+    <a:lnDef>
+      <a:spPr/>
+      <a:bodyPr/>
+      <a:lstStyle/>
+      <a:style>
+        <a:lnRef idx="2">
+          <a:schemeClr val="accent1"/>
+        </a:lnRef>
+        <a:fillRef idx="0">
+          <a:schemeClr val="accent1"/>
+        </a:fillRef>
+        <a:effectRef idx="1">
+          <a:schemeClr val="accent1"/>
+        </a:effectRef>
+        <a:fontRef idx="minor">
+          <a:schemeClr val="tx1"/>
+        </a:fontRef>
+      </a:style>
+    </a:lnDef>
+  </a:objectDefaults>
+  <a:extraClrSchemeLst/>
+</a:theme>
 </file>
</xml_diff>

<commit_message>
fix indentation and tabs-to-whitespace;
</commit_message>
<xml_diff>
--- a/Snakemake-introduction.pptx
+++ b/Snakemake-introduction.pptx
@@ -239,7 +239,7 @@
           <a:p>
             <a:fld id="{4891E098-7F76-E040-9498-94D26AD9F8BA}" type="datetimeFigureOut">
               <a:rPr lang="en-US" smtClean="0"/>
-              <a:t>03/02/16</a:t>
+              <a:t>04/02/16</a:t>
             </a:fld>
             <a:endParaRPr lang="en-US"/>
           </a:p>
@@ -404,7 +404,7 @@
           <a:p>
             <a:fld id="{80F2A791-70DC-5A48-8A86-A9BEF1E5AF31}" type="datetimeFigureOut">
               <a:rPr lang="en-US" smtClean="0"/>
-              <a:t>03/02/16</a:t>
+              <a:t>04/02/16</a:t>
             </a:fld>
             <a:endParaRPr lang="en-US"/>
           </a:p>
@@ -1134,7 +1134,7 @@
           <a:p>
             <a:fld id="{46A9EBDE-973B-3143-84A2-17DBAED876D2}" type="datetimeFigureOut">
               <a:rPr lang="en-US" smtClean="0"/>
-              <a:t>03/02/16</a:t>
+              <a:t>04/02/16</a:t>
             </a:fld>
             <a:endParaRPr lang="en-US"/>
           </a:p>
@@ -1338,7 +1338,7 @@
           <a:p>
             <a:fld id="{46A9EBDE-973B-3143-84A2-17DBAED876D2}" type="datetimeFigureOut">
               <a:rPr lang="en-US" smtClean="0"/>
-              <a:t>03/02/16</a:t>
+              <a:t>04/02/16</a:t>
             </a:fld>
             <a:endParaRPr lang="en-US"/>
           </a:p>
@@ -1532,7 +1532,7 @@
           <a:p>
             <a:fld id="{46A9EBDE-973B-3143-84A2-17DBAED876D2}" type="datetimeFigureOut">
               <a:rPr lang="en-US" smtClean="0"/>
-              <a:t>03/02/16</a:t>
+              <a:t>04/02/16</a:t>
             </a:fld>
             <a:endParaRPr lang="en-US"/>
           </a:p>
@@ -1802,7 +1802,7 @@
           <a:p>
             <a:fld id="{46A9EBDE-973B-3143-84A2-17DBAED876D2}" type="datetimeFigureOut">
               <a:rPr lang="en-US" smtClean="0"/>
-              <a:t>03/02/16</a:t>
+              <a:t>04/02/16</a:t>
             </a:fld>
             <a:endParaRPr lang="en-US"/>
           </a:p>
@@ -2114,7 +2114,7 @@
           <a:p>
             <a:fld id="{46A9EBDE-973B-3143-84A2-17DBAED876D2}" type="datetimeFigureOut">
               <a:rPr lang="en-US" smtClean="0"/>
-              <a:t>03/02/16</a:t>
+              <a:t>04/02/16</a:t>
             </a:fld>
             <a:endParaRPr lang="en-US"/>
           </a:p>
@@ -2560,7 +2560,7 @@
           <a:p>
             <a:fld id="{46A9EBDE-973B-3143-84A2-17DBAED876D2}" type="datetimeFigureOut">
               <a:rPr lang="en-US" smtClean="0"/>
-              <a:t>03/02/16</a:t>
+              <a:t>04/02/16</a:t>
             </a:fld>
             <a:endParaRPr lang="en-US"/>
           </a:p>
@@ -2702,7 +2702,7 @@
           <a:p>
             <a:fld id="{46A9EBDE-973B-3143-84A2-17DBAED876D2}" type="datetimeFigureOut">
               <a:rPr lang="en-US" smtClean="0"/>
-              <a:t>03/02/16</a:t>
+              <a:t>04/02/16</a:t>
             </a:fld>
             <a:endParaRPr lang="en-US"/>
           </a:p>
@@ -2821,7 +2821,7 @@
           <a:p>
             <a:fld id="{46A9EBDE-973B-3143-84A2-17DBAED876D2}" type="datetimeFigureOut">
               <a:rPr lang="en-US" smtClean="0"/>
-              <a:t>03/02/16</a:t>
+              <a:t>04/02/16</a:t>
             </a:fld>
             <a:endParaRPr lang="en-US"/>
           </a:p>
@@ -3122,7 +3122,7 @@
           <a:p>
             <a:fld id="{46A9EBDE-973B-3143-84A2-17DBAED876D2}" type="datetimeFigureOut">
               <a:rPr lang="en-US" smtClean="0"/>
-              <a:t>03/02/16</a:t>
+              <a:t>04/02/16</a:t>
             </a:fld>
             <a:endParaRPr lang="en-US"/>
           </a:p>
@@ -3399,7 +3399,7 @@
           <a:p>
             <a:fld id="{46A9EBDE-973B-3143-84A2-17DBAED876D2}" type="datetimeFigureOut">
               <a:rPr lang="en-US" smtClean="0"/>
-              <a:t>03/02/16</a:t>
+              <a:t>04/02/16</a:t>
             </a:fld>
             <a:endParaRPr lang="en-US"/>
           </a:p>
@@ -7360,11 +7360,7 @@
             </a:r>
             <a:r>
               <a:rPr lang="en-US" b="1" dirty="0" smtClean="0"/>
-              <a:t> </a:t>
-            </a:r>
-            <a:r>
-              <a:rPr lang="en-US" b="1" dirty="0" smtClean="0"/>
-              <a:t>/g/</a:t>
+              <a:t> /g/</a:t>
             </a:r>
             <a:r>
               <a:rPr lang="en-US" b="1" dirty="0" err="1" smtClean="0"/>
@@ -7436,7 +7432,6 @@
               <a:rPr lang="en-US" sz="2400" b="1" dirty="0" smtClean="0"/>
               <a:t>)</a:t>
             </a:r>
-            <a:endParaRPr lang="en-US" sz="2400" b="1" dirty="0" smtClean="0"/>
           </a:p>
           <a:p>
             <a:pPr marL="0" indent="0">
@@ -9634,15 +9629,7 @@
             </a:r>
             <a:r>
               <a:rPr lang="nl-NL" b="1" dirty="0" smtClean="0"/>
-              <a:t>cut </a:t>
-            </a:r>
-            <a:r>
-              <a:rPr lang="nl-NL" b="1" dirty="0" smtClean="0"/>
-              <a:t>-f1 </a:t>
-            </a:r>
-            <a:r>
-              <a:rPr lang="nl-NL" b="1" dirty="0" smtClean="0"/>
-              <a:t>–d ‘ ‘  </a:t>
+              <a:t>cut -f1 –d ‘ ‘  </a:t>
             </a:r>
             <a:r>
               <a:rPr lang="en-US" b="1" dirty="0" smtClean="0"/>
@@ -24528,11 +24515,7 @@
             </a:pPr>
             <a:r>
               <a:rPr lang="en-US" b="1" dirty="0" smtClean="0"/>
-              <a:t>05</a:t>
-            </a:r>
-            <a:r>
-              <a:rPr lang="en-US" b="1" dirty="0" smtClean="0"/>
-              <a:t>-foreach/</a:t>
+              <a:t>05-foreach/</a:t>
             </a:r>
           </a:p>
         </p:txBody>
@@ -24870,7 +24853,7 @@
         <p:spPr>
           <a:xfrm>
             <a:off x="709759" y="1434520"/>
-            <a:ext cx="3647941" cy="369332"/>
+            <a:ext cx="2549909" cy="369332"/>
           </a:xfrm>
           <a:prstGeom prst="rect">
             <a:avLst/>
@@ -24888,20 +24871,20 @@
               <a:t>SAMPLES = “</a:t>
             </a:r>
             <a:r>
+              <a:rPr lang="en-US" b="1" dirty="0" smtClean="0"/>
+              <a:t>A </a:t>
+            </a:r>
+            <a:r>
               <a:rPr lang="en-US" b="1" dirty="0" err="1" smtClean="0"/>
-              <a:t>A.fasta</a:t>
+              <a:t>B”</a:t>
+            </a:r>
+            <a:r>
+              <a:rPr lang="en-US" b="1" dirty="0" err="1" smtClean="0"/>
+              <a:t>.split</a:t>
             </a:r>
             <a:r>
               <a:rPr lang="en-US" b="1" dirty="0" smtClean="0"/>
-              <a:t> B.</a:t>
-            </a:r>
-            <a:r>
-              <a:rPr lang="en-US" b="1" dirty="0" err="1" smtClean="0"/>
-              <a:t>fasta</a:t>
-            </a:r>
-            <a:r>
-              <a:rPr lang="en-US" b="1" dirty="0" smtClean="0"/>
-              <a:t>”.split()</a:t>
+              <a:t>()</a:t>
             </a:r>
           </a:p>
         </p:txBody>

</xml_diff>

<commit_message>
fix and added cloud connections
</commit_message>
<xml_diff>
--- a/Snakemake-introduction.pptx
+++ b/Snakemake-introduction.pptx
@@ -24868,19 +24868,11 @@
           <a:p>
             <a:r>
               <a:rPr lang="en-US" b="1" dirty="0" smtClean="0"/>
-              <a:t>SAMPLES = “</a:t>
-            </a:r>
-            <a:r>
-              <a:rPr lang="en-US" b="1" dirty="0" smtClean="0"/>
-              <a:t>A </a:t>
+              <a:t>SAMPLES = “A </a:t>
             </a:r>
             <a:r>
               <a:rPr lang="en-US" b="1" dirty="0" err="1" smtClean="0"/>
-              <a:t>B”</a:t>
-            </a:r>
-            <a:r>
-              <a:rPr lang="en-US" b="1" dirty="0" err="1" smtClean="0"/>
-              <a:t>.split</a:t>
+              <a:t>B”.split</a:t>
             </a:r>
             <a:r>
               <a:rPr lang="en-US" b="1" dirty="0" smtClean="0"/>
@@ -31539,12 +31531,18 @@
         </p:nvSpPr>
         <p:spPr/>
         <p:txBody>
-          <a:bodyPr/>
+          <a:bodyPr>
+            <a:normAutofit fontScale="90000"/>
+          </a:bodyPr>
           <a:lstStyle/>
           <a:p>
             <a:r>
               <a:rPr lang="en-US" dirty="0" smtClean="0"/>
-              <a:t>Outlook for next tutorial</a:t>
+              <a:t>Outlook for </a:t>
+            </a:r>
+            <a:r>
+              <a:rPr lang="en-US" dirty="0" smtClean="0"/>
+              <a:t>a possible next tutorial</a:t>
             </a:r>
             <a:endParaRPr lang="en-US" dirty="0"/>
           </a:p>
@@ -31568,7 +31566,7 @@
         </p:spPr>
         <p:txBody>
           <a:bodyPr>
-            <a:normAutofit lnSpcReduction="10000"/>
+            <a:normAutofit fontScale="85000" lnSpcReduction="20000"/>
           </a:bodyPr>
           <a:lstStyle/>
           <a:p>
@@ -31625,34 +31623,62 @@
           <a:p>
             <a:r>
               <a:rPr lang="en-US" dirty="0" smtClean="0"/>
-              <a:t>Sub </a:t>
-            </a:r>
-            <a:r>
-              <a:rPr lang="en-US" dirty="0" err="1"/>
-              <a:t>wWorkflow</a:t>
+              <a:t>Workflow </a:t>
             </a:r>
             <a:r>
               <a:rPr lang="en-US" dirty="0"/>
-              <a:t> sharing</a:t>
-            </a:r>
-          </a:p>
-          <a:p>
-            <a:r>
-              <a:rPr lang="en-US" dirty="0" err="1" smtClean="0"/>
-              <a:t>orkflows</a:t>
-            </a:r>
+              <a:t>sharing</a:t>
+            </a:r>
+          </a:p>
+          <a:p>
             <a:r>
               <a:rPr lang="en-US" dirty="0" smtClean="0"/>
-              <a:t> </a:t>
-            </a:r>
-            <a:r>
-              <a:rPr lang="en-US" dirty="0" err="1" smtClean="0"/>
-              <a:t>etc</a:t>
+              <a:t>Sub w</a:t>
+            </a:r>
+            <a:r>
+              <a:rPr lang="en-US" dirty="0" smtClean="0"/>
+              <a:t>orkflows </a:t>
+            </a:r>
+          </a:p>
+          <a:p>
+            <a:r>
+              <a:rPr lang="en-US" dirty="0" smtClean="0"/>
+              <a:t>Cloud connection</a:t>
+            </a:r>
+          </a:p>
+          <a:p>
+            <a:r>
+              <a:rPr lang="is-IS" dirty="0" smtClean="0"/>
+              <a:t>…</a:t>
             </a:r>
             <a:endParaRPr lang="en-US" dirty="0" smtClean="0"/>
           </a:p>
         </p:txBody>
       </p:sp>
+      <p:pic>
+        <p:nvPicPr>
+          <p:cNvPr id="4" name="Picture 3"/>
+          <p:cNvPicPr>
+            <a:picLocks noChangeAspect="1"/>
+          </p:cNvPicPr>
+          <p:nvPr/>
+        </p:nvPicPr>
+        <p:blipFill>
+          <a:blip r:embed="rId2"/>
+          <a:stretch>
+            <a:fillRect/>
+          </a:stretch>
+        </p:blipFill>
+        <p:spPr>
+          <a:xfrm>
+            <a:off x="3288826" y="3085927"/>
+            <a:ext cx="4397745" cy="4397745"/>
+          </a:xfrm>
+          <a:prstGeom prst="rect">
+            <a:avLst/>
+          </a:prstGeom>
+        </p:spPr>
+      </p:pic>
     </p:spTree>
     <p:extLst>
       <p:ext uri="{BB962C8B-B14F-4D97-AF65-F5344CB8AC3E}">

</xml_diff>